<commit_message>
[AERO] Version finale des fichiers
</commit_message>
<xml_diff>
--- a/Planches Aero-Breizh.pptx
+++ b/Planches Aero-Breizh.pptx
@@ -5,7 +5,7 @@
     <p:sldMasterId id="2147483648" r:id="rId1"/>
   </p:sldMasterIdLst>
   <p:notesMasterIdLst>
-    <p:notesMasterId r:id="rId20"/>
+    <p:notesMasterId r:id="rId17"/>
   </p:notesMasterIdLst>
   <p:sldIdLst>
     <p:sldId id="256" r:id="rId2"/>
@@ -18,14 +18,11 @@
     <p:sldId id="266" r:id="rId9"/>
     <p:sldId id="265" r:id="rId10"/>
     <p:sldId id="269" r:id="rId11"/>
-    <p:sldId id="263" r:id="rId12"/>
-    <p:sldId id="268" r:id="rId13"/>
-    <p:sldId id="270" r:id="rId14"/>
-    <p:sldId id="267" r:id="rId15"/>
-    <p:sldId id="259" r:id="rId16"/>
-    <p:sldId id="273" r:id="rId17"/>
-    <p:sldId id="272" r:id="rId18"/>
-    <p:sldId id="271" r:id="rId19"/>
+    <p:sldId id="267" r:id="rId12"/>
+    <p:sldId id="274" r:id="rId13"/>
+    <p:sldId id="259" r:id="rId14"/>
+    <p:sldId id="271" r:id="rId15"/>
+    <p:sldId id="268" r:id="rId16"/>
   </p:sldIdLst>
   <p:sldSz cx="12192000" cy="6858000"/>
   <p:notesSz cx="6858000" cy="9144000"/>
@@ -214,7 +211,7 @@
           <a:p>
             <a:fld id="{ADEB88CA-9D90-45EE-8D23-CE7AB05CA88B}" type="datetimeFigureOut">
               <a:rPr lang="fr-FR" smtClean="0"/>
-              <a:t>11/02/2018</a:t>
+              <a:t>12/02/2018</a:t>
             </a:fld>
             <a:endParaRPr lang="fr-FR"/>
           </a:p>
@@ -672,7 +669,7 @@
           <a:p>
             <a:fld id="{D3CD40F4-7F1F-4C23-9A52-B557A1005173}" type="datetime1">
               <a:rPr lang="en-US" smtClean="0"/>
-              <a:t>2/11/2018</a:t>
+              <a:t>2/12/2018</a:t>
             </a:fld>
             <a:endParaRPr lang="en-US" dirty="0"/>
           </a:p>
@@ -1104,7 +1101,7 @@
           <a:p>
             <a:fld id="{24D4D17B-16BD-4F89-8B8A-B41BB1E82896}" type="datetime1">
               <a:rPr lang="en-US" smtClean="0"/>
-              <a:t>2/11/2018</a:t>
+              <a:t>2/12/2018</a:t>
             </a:fld>
             <a:endParaRPr lang="en-US" dirty="0"/>
           </a:p>
@@ -1350,7 +1347,7 @@
           <a:p>
             <a:fld id="{C5A941E7-C599-49F6-8FEA-498750F1E9B1}" type="datetime1">
               <a:rPr lang="en-US" smtClean="0"/>
-              <a:t>2/11/2018</a:t>
+              <a:t>2/12/2018</a:t>
             </a:fld>
             <a:endParaRPr lang="en-US" dirty="0"/>
           </a:p>
@@ -1654,7 +1651,7 @@
           <a:p>
             <a:fld id="{5A42BCC7-6672-404C-9096-2E18C146DFB8}" type="datetime1">
               <a:rPr lang="en-US" smtClean="0"/>
-              <a:t>2/11/2018</a:t>
+              <a:t>2/12/2018</a:t>
             </a:fld>
             <a:endParaRPr lang="en-US" dirty="0"/>
           </a:p>
@@ -1968,7 +1965,7 @@
           <a:p>
             <a:fld id="{E9E7BA27-D4E1-4D3B-A778-BEC7B538650F}" type="datetime1">
               <a:rPr lang="en-US" smtClean="0"/>
-              <a:t>2/11/2018</a:t>
+              <a:t>2/12/2018</a:t>
             </a:fld>
             <a:endParaRPr lang="en-US" dirty="0"/>
           </a:p>
@@ -2266,7 +2263,7 @@
           <a:p>
             <a:fld id="{10602C5A-73A2-4FBE-B803-4DB3ACAAF54A}" type="datetime1">
               <a:rPr lang="en-US" smtClean="0"/>
-              <a:t>2/11/2018</a:t>
+              <a:t>2/12/2018</a:t>
             </a:fld>
             <a:endParaRPr lang="en-US" dirty="0"/>
           </a:p>
@@ -2629,7 +2626,7 @@
           <a:p>
             <a:fld id="{63EB30DF-03E1-4C36-8FB3-71313EF5B8E4}" type="datetime1">
               <a:rPr lang="en-US" smtClean="0"/>
-              <a:t>2/11/2018</a:t>
+              <a:t>2/12/2018</a:t>
             </a:fld>
             <a:endParaRPr lang="en-US" dirty="0"/>
           </a:p>
@@ -2799,7 +2796,7 @@
           <a:p>
             <a:fld id="{13FE6D2B-036B-4326-B5BA-7099AC11FECE}" type="datetime1">
               <a:rPr lang="en-US" smtClean="0"/>
-              <a:t>2/11/2018</a:t>
+              <a:t>2/12/2018</a:t>
             </a:fld>
             <a:endParaRPr lang="en-US" dirty="0"/>
           </a:p>
@@ -2975,7 +2972,7 @@
           <a:p>
             <a:fld id="{21FC3E73-CB9C-4F35-B780-D4340606F970}" type="datetime1">
               <a:rPr lang="en-US" smtClean="0"/>
-              <a:t>2/11/2018</a:t>
+              <a:t>2/12/2018</a:t>
             </a:fld>
             <a:endParaRPr lang="en-US" dirty="0"/>
           </a:p>
@@ -3141,7 +3138,7 @@
           <a:p>
             <a:fld id="{94A5A19E-D510-4573-88D7-909E396BB018}" type="datetime1">
               <a:rPr lang="en-US" smtClean="0"/>
-              <a:t>2/11/2018</a:t>
+              <a:t>2/12/2018</a:t>
             </a:fld>
             <a:endParaRPr lang="en-US" dirty="0"/>
           </a:p>
@@ -3387,7 +3384,7 @@
           <a:p>
             <a:fld id="{DC8A5EAB-A4A2-4AB6-98B6-2D5A858E6169}" type="datetime1">
               <a:rPr lang="en-US" smtClean="0"/>
-              <a:t>2/11/2018</a:t>
+              <a:t>2/12/2018</a:t>
             </a:fld>
             <a:endParaRPr lang="en-US" dirty="0"/>
           </a:p>
@@ -3619,7 +3616,7 @@
           <a:p>
             <a:fld id="{3B2BE268-204D-42E5-9781-E1861139ACEC}" type="datetime1">
               <a:rPr lang="en-US" smtClean="0"/>
-              <a:t>2/11/2018</a:t>
+              <a:t>2/12/2018</a:t>
             </a:fld>
             <a:endParaRPr lang="en-US" dirty="0"/>
           </a:p>
@@ -3997,7 +3994,7 @@
           <a:p>
             <a:fld id="{6E0B03AF-BC48-4377-B2AB-3A13980C9CC1}" type="datetime1">
               <a:rPr lang="en-US" smtClean="0"/>
-              <a:t>2/11/2018</a:t>
+              <a:t>2/12/2018</a:t>
             </a:fld>
             <a:endParaRPr lang="en-US" dirty="0"/>
           </a:p>
@@ -4111,7 +4108,7 @@
           <a:p>
             <a:fld id="{C1EDE206-8F9E-4F63-93EB-63FC7EF84862}" type="datetime1">
               <a:rPr lang="en-US" smtClean="0"/>
-              <a:t>2/11/2018</a:t>
+              <a:t>2/12/2018</a:t>
             </a:fld>
             <a:endParaRPr lang="en-US" dirty="0"/>
           </a:p>
@@ -4202,7 +4199,7 @@
           <a:p>
             <a:fld id="{CC3405BD-6C27-41A7-A00A-7156C82EABC4}" type="datetime1">
               <a:rPr lang="en-US" smtClean="0"/>
-              <a:t>2/11/2018</a:t>
+              <a:t>2/12/2018</a:t>
             </a:fld>
             <a:endParaRPr lang="en-US" dirty="0"/>
           </a:p>
@@ -4453,7 +4450,7 @@
           <a:p>
             <a:fld id="{D4484932-0B50-4301-A6BF-A1731F638AB4}" type="datetime1">
               <a:rPr lang="en-US" smtClean="0"/>
-              <a:t>2/11/2018</a:t>
+              <a:t>2/12/2018</a:t>
             </a:fld>
             <a:endParaRPr lang="en-US" dirty="0"/>
           </a:p>
@@ -4732,7 +4729,7 @@
           <a:p>
             <a:fld id="{E2F82350-00B6-4FC6-9B2E-0052222B3451}" type="datetime1">
               <a:rPr lang="en-US" smtClean="0"/>
-              <a:t>2/11/2018</a:t>
+              <a:t>2/12/2018</a:t>
             </a:fld>
             <a:endParaRPr lang="en-US" dirty="0"/>
           </a:p>
@@ -5134,7 +5131,7 @@
           <a:p>
             <a:fld id="{ADD542B3-CE64-4D59-BCCB-98D9825C7338}" type="datetime1">
               <a:rPr lang="en-US" smtClean="0"/>
-              <a:t>2/11/2018</a:t>
+              <a:t>2/12/2018</a:t>
             </a:fld>
             <a:endParaRPr lang="en-US" dirty="0"/>
           </a:p>
@@ -5688,12 +5685,8 @@
           <a:lstStyle/>
           <a:p>
             <a:r>
-              <a:rPr lang="fr-FR" dirty="0"/>
-              <a:t>Aero-</a:t>
-            </a:r>
-            <a:r>
               <a:rPr lang="fr-FR" dirty="0" err="1"/>
-              <a:t>breizh</a:t>
+              <a:t>Aero-breizh</a:t>
             </a:r>
             <a:endParaRPr lang="fr-FR" dirty="0"/>
           </a:p>
@@ -5770,6 +5763,13 @@
   <p:clrMapOvr>
     <a:masterClrMapping/>
   </p:clrMapOvr>
+  <p:timing>
+    <p:tnLst>
+      <p:par>
+        <p:cTn id="1" dur="indefinite" restart="never" nodeType="tmRoot"/>
+      </p:par>
+    </p:tnLst>
+  </p:timing>
 </p:sld>
 </file>
 
@@ -5827,9 +5827,16 @@
                   </a:schemeClr>
                 </a:solidFill>
               </a:rPr>
-              <a:t>Analyse d’architecture applicative</a:t>
-            </a:r>
-            <a:endParaRPr lang="fr-FR" dirty="0"/>
+              <a:t>Analyse du système d’information</a:t>
+            </a:r>
+            <a:endParaRPr lang="fr-FR" dirty="0">
+              <a:solidFill>
+                <a:schemeClr val="bg2">
+                  <a:lumMod val="20000"/>
+                  <a:lumOff val="80000"/>
+                </a:schemeClr>
+              </a:solidFill>
+            </a:endParaRPr>
           </a:p>
         </p:txBody>
       </p:sp>
@@ -5881,6 +5888,13 @@
   <p:clrMapOvr>
     <a:masterClrMapping/>
   </p:clrMapOvr>
+  <p:timing>
+    <p:tnLst>
+      <p:par>
+        <p:cTn id="1" dur="indefinite" restart="never" nodeType="tmRoot"/>
+      </p:par>
+    </p:tnLst>
+  </p:timing>
 </p:sld>
 </file>
 
@@ -5936,6 +5950,7 @@
               <a:rPr lang="fr-FR" dirty="0"/>
               <a:t>actuel</a:t>
             </a:r>
+            <a:endParaRPr lang="en-GB" dirty="0"/>
           </a:p>
         </p:txBody>
       </p:sp>
@@ -5944,7 +5959,7 @@
           <p:cNvPr id="4" name="Espace réservé du contenu 3">
             <a:extLst>
               <a:ext uri="{FF2B5EF4-FFF2-40B4-BE49-F238E27FC236}">
-                <a16:creationId xmlns:a16="http://schemas.microsoft.com/office/drawing/2014/main" id="{407EC233-0BC5-428D-85DC-2E55CD35000F}"/>
+                <a16:creationId xmlns:a16="http://schemas.microsoft.com/office/drawing/2014/main" id="{953D5B9D-20A5-4932-974F-4631FA2B6F8D}"/>
               </a:ext>
             </a:extLst>
           </p:cNvPr>
@@ -5963,8 +5978,8 @@
         </p:blipFill>
         <p:spPr>
           <a:xfrm>
-            <a:off x="2224087" y="2557462"/>
-            <a:ext cx="7743825" cy="1743075"/>
+            <a:off x="1295400" y="1765407"/>
+            <a:ext cx="9601200" cy="3629025"/>
           </a:xfrm>
           <a:prstGeom prst="rect">
             <a:avLst/>
@@ -5986,7 +6001,7 @@
           <p:cNvPr id="6" name="Espace réservé du numéro de diapositive 5">
             <a:extLst>
               <a:ext uri="{FF2B5EF4-FFF2-40B4-BE49-F238E27FC236}">
-                <a16:creationId xmlns:a16="http://schemas.microsoft.com/office/drawing/2014/main" id="{3390B3D1-D77E-4AD4-ACF0-40DCF5EE91AB}"/>
+                <a16:creationId xmlns:a16="http://schemas.microsoft.com/office/drawing/2014/main" id="{9DF81448-6159-4B6A-AEA9-E5D06F770306}"/>
               </a:ext>
             </a:extLst>
           </p:cNvPr>
@@ -6022,13 +6037,20 @@
     </p:spTree>
     <p:extLst>
       <p:ext uri="{BB962C8B-B14F-4D97-AF65-F5344CB8AC3E}">
-        <p14:creationId xmlns:p14="http://schemas.microsoft.com/office/powerpoint/2010/main" val="2304952496"/>
+        <p14:creationId xmlns:p14="http://schemas.microsoft.com/office/powerpoint/2010/main" val="2701177395"/>
       </p:ext>
     </p:extLst>
   </p:cSld>
   <p:clrMapOvr>
     <a:masterClrMapping/>
   </p:clrMapOvr>
+  <p:timing>
+    <p:tnLst>
+      <p:par>
+        <p:cTn id="1" dur="indefinite" restart="never" nodeType="tmRoot"/>
+      </p:par>
+    </p:tnLst>
+  </p:timing>
 </p:sld>
 </file>
 
@@ -6077,9 +6099,496 @@
           <a:p>
             <a:pPr algn="ctr"/>
             <a:r>
-              <a:rPr lang="fr-FR" dirty="0"/>
-              <a:t>Architecture cible</a:t>
-            </a:r>
+              <a:rPr lang="fr-FR" dirty="0" smtClean="0"/>
+              <a:t>Projets retenus</a:t>
+            </a:r>
+            <a:endParaRPr lang="fr-FR" dirty="0"/>
+          </a:p>
+        </p:txBody>
+      </p:sp>
+      <p:sp>
+        <p:nvSpPr>
+          <p:cNvPr id="3" name="Espace réservé du contenu 2">
+            <a:extLst>
+              <a:ext uri="{FF2B5EF4-FFF2-40B4-BE49-F238E27FC236}">
+                <a16:creationId xmlns:a16="http://schemas.microsoft.com/office/drawing/2014/main" id="{77103813-D207-4F33-A18E-24C91BD78695}"/>
+              </a:ext>
+            </a:extLst>
+          </p:cNvPr>
+          <p:cNvSpPr>
+            <a:spLocks noGrp="1"/>
+          </p:cNvSpPr>
+          <p:nvPr>
+            <p:ph idx="1"/>
+          </p:nvPr>
+        </p:nvSpPr>
+        <p:spPr>
+          <a:xfrm>
+            <a:off x="0" y="1531456"/>
+            <a:ext cx="12192000" cy="5326544"/>
+          </a:xfrm>
+        </p:spPr>
+        <p:txBody>
+          <a:bodyPr/>
+          <a:lstStyle/>
+          <a:p>
+            <a:r>
+              <a:rPr lang="fr-FR" dirty="0" smtClean="0">
+                <a:solidFill>
+                  <a:schemeClr val="bg2">
+                    <a:lumMod val="20000"/>
+                    <a:lumOff val="80000"/>
+                  </a:schemeClr>
+                </a:solidFill>
+              </a:rPr>
+              <a:t>Projet AeroNet</a:t>
+            </a:r>
+          </a:p>
+          <a:p>
+            <a:r>
+              <a:rPr lang="fr-FR" dirty="0">
+                <a:solidFill>
+                  <a:schemeClr val="bg2">
+                    <a:lumMod val="20000"/>
+                    <a:lumOff val="80000"/>
+                  </a:schemeClr>
+                </a:solidFill>
+              </a:rPr>
+              <a:t>Projet </a:t>
+            </a:r>
+            <a:r>
+              <a:rPr lang="fr-FR" dirty="0" smtClean="0">
+                <a:solidFill>
+                  <a:schemeClr val="bg2">
+                    <a:lumMod val="20000"/>
+                    <a:lumOff val="80000"/>
+                  </a:schemeClr>
+                </a:solidFill>
+              </a:rPr>
+              <a:t>Anis</a:t>
+            </a:r>
+            <a:endParaRPr lang="fr-FR" dirty="0">
+              <a:solidFill>
+                <a:schemeClr val="bg2">
+                  <a:lumMod val="20000"/>
+                  <a:lumOff val="80000"/>
+                </a:schemeClr>
+              </a:solidFill>
+            </a:endParaRPr>
+          </a:p>
+        </p:txBody>
+      </p:sp>
+      <p:sp>
+        <p:nvSpPr>
+          <p:cNvPr id="5" name="Espace réservé du numéro de diapositive 4">
+            <a:extLst>
+              <a:ext uri="{FF2B5EF4-FFF2-40B4-BE49-F238E27FC236}">
+                <a16:creationId xmlns:a16="http://schemas.microsoft.com/office/drawing/2014/main" id="{17813170-608E-4BE9-8412-6DCF9D66C34E}"/>
+              </a:ext>
+            </a:extLst>
+          </p:cNvPr>
+          <p:cNvSpPr>
+            <a:spLocks noGrp="1"/>
+          </p:cNvSpPr>
+          <p:nvPr>
+            <p:ph type="sldNum" sz="quarter" idx="12"/>
+          </p:nvPr>
+        </p:nvSpPr>
+        <p:spPr/>
+        <p:txBody>
+          <a:bodyPr/>
+          <a:lstStyle/>
+          <a:p>
+            <a:fld id="{D57F1E4F-1CFF-5643-939E-217C01CDF565}" type="slidenum">
+              <a:rPr lang="en-US" sz="1800" smtClean="0">
+                <a:solidFill>
+                  <a:schemeClr val="tx1"/>
+                </a:solidFill>
+              </a:rPr>
+              <a:pPr/>
+              <a:t>12</a:t>
+            </a:fld>
+            <a:endParaRPr lang="en-US" sz="1800" dirty="0">
+              <a:solidFill>
+                <a:schemeClr val="tx1"/>
+              </a:solidFill>
+            </a:endParaRPr>
+          </a:p>
+        </p:txBody>
+      </p:sp>
+    </p:spTree>
+    <p:extLst>
+      <p:ext uri="{BB962C8B-B14F-4D97-AF65-F5344CB8AC3E}">
+        <p14:creationId xmlns:p14="http://schemas.microsoft.com/office/powerpoint/2010/main" val="2844427624"/>
+      </p:ext>
+    </p:extLst>
+  </p:cSld>
+  <p:clrMapOvr>
+    <a:masterClrMapping/>
+  </p:clrMapOvr>
+  <p:timing>
+    <p:tnLst>
+      <p:par>
+        <p:cTn id="1" dur="indefinite" restart="never" nodeType="tmRoot"/>
+      </p:par>
+    </p:tnLst>
+  </p:timing>
+</p:sld>
+</file>
+
+<file path=ppt/slides/slide13.xml><?xml version="1.0" encoding="utf-8"?>
+<p:sld xmlns:a="http://schemas.openxmlformats.org/drawingml/2006/main" xmlns:r="http://schemas.openxmlformats.org/officeDocument/2006/relationships" xmlns:p="http://schemas.openxmlformats.org/presentationml/2006/main">
+  <p:cSld>
+    <p:spTree>
+      <p:nvGrpSpPr>
+        <p:cNvPr id="1" name=""/>
+        <p:cNvGrpSpPr/>
+        <p:nvPr/>
+      </p:nvGrpSpPr>
+      <p:grpSpPr>
+        <a:xfrm>
+          <a:off x="0" y="0"/>
+          <a:ext cx="0" cy="0"/>
+          <a:chOff x="0" y="0"/>
+          <a:chExt cx="0" cy="0"/>
+        </a:xfrm>
+      </p:grpSpPr>
+      <p:sp>
+        <p:nvSpPr>
+          <p:cNvPr id="2" name="Titre 1">
+            <a:extLst>
+              <a:ext uri="{FF2B5EF4-FFF2-40B4-BE49-F238E27FC236}">
+                <a16:creationId xmlns:a16="http://schemas.microsoft.com/office/drawing/2014/main" id="{7CCBB51A-EDE8-4C6A-9AD7-E8F13DA5D6F3}"/>
+              </a:ext>
+            </a:extLst>
+          </p:cNvPr>
+          <p:cNvSpPr>
+            <a:spLocks noGrp="1"/>
+          </p:cNvSpPr>
+          <p:nvPr>
+            <p:ph type="title"/>
+          </p:nvPr>
+        </p:nvSpPr>
+        <p:spPr>
+          <a:xfrm>
+            <a:off x="0" y="24389"/>
+            <a:ext cx="12192000" cy="1507067"/>
+          </a:xfrm>
+        </p:spPr>
+        <p:txBody>
+          <a:bodyPr/>
+          <a:lstStyle/>
+          <a:p>
+            <a:pPr algn="ctr"/>
+            <a:r>
+              <a:rPr lang="fr-FR" dirty="0" smtClean="0"/>
+              <a:t>Projet </a:t>
+            </a:r>
+            <a:r>
+              <a:rPr lang="fr-FR" dirty="0" err="1" smtClean="0"/>
+              <a:t>aeronet</a:t>
+            </a:r>
+            <a:endParaRPr lang="en-GB" dirty="0"/>
+          </a:p>
+        </p:txBody>
+      </p:sp>
+      <p:sp>
+        <p:nvSpPr>
+          <p:cNvPr id="6" name="Espace réservé du numéro de diapositive 5">
+            <a:extLst>
+              <a:ext uri="{FF2B5EF4-FFF2-40B4-BE49-F238E27FC236}">
+                <a16:creationId xmlns:a16="http://schemas.microsoft.com/office/drawing/2014/main" id="{7826644F-241E-43C6-8A5A-F7DD89DFC242}"/>
+              </a:ext>
+            </a:extLst>
+          </p:cNvPr>
+          <p:cNvSpPr>
+            <a:spLocks noGrp="1"/>
+          </p:cNvSpPr>
+          <p:nvPr>
+            <p:ph type="sldNum" sz="quarter" idx="12"/>
+          </p:nvPr>
+        </p:nvSpPr>
+        <p:spPr/>
+        <p:txBody>
+          <a:bodyPr vert="horz" lIns="91440" tIns="45720" rIns="91440" bIns="45720" rtlCol="0" anchor="b"/>
+          <a:lstStyle/>
+          <a:p>
+            <a:fld id="{D57F1E4F-1CFF-5643-939E-217C01CDF565}" type="slidenum">
+              <a:rPr lang="en-US" sz="1800" smtClean="0">
+                <a:solidFill>
+                  <a:schemeClr val="tx1"/>
+                </a:solidFill>
+              </a:rPr>
+              <a:pPr/>
+              <a:t>13</a:t>
+            </a:fld>
+            <a:endParaRPr lang="en-US" sz="1800" dirty="0">
+              <a:solidFill>
+                <a:schemeClr val="tx1"/>
+              </a:solidFill>
+            </a:endParaRPr>
+          </a:p>
+        </p:txBody>
+      </p:sp>
+      <p:pic>
+        <p:nvPicPr>
+          <p:cNvPr id="7" name="Image 6"/>
+          <p:cNvPicPr/>
+          <p:nvPr/>
+        </p:nvPicPr>
+        <p:blipFill>
+          <a:blip r:embed="rId2"/>
+          <a:stretch>
+            <a:fillRect/>
+          </a:stretch>
+        </p:blipFill>
+        <p:spPr>
+          <a:xfrm>
+            <a:off x="1371756" y="1397834"/>
+            <a:ext cx="9448488" cy="4850566"/>
+          </a:xfrm>
+          <a:prstGeom prst="rect">
+            <a:avLst/>
+          </a:prstGeom>
+          <a:ln>
+            <a:noFill/>
+          </a:ln>
+          <a:effectLst>
+            <a:outerShdw blurRad="190500" algn="tl" rotWithShape="0">
+              <a:srgbClr val="000000">
+                <a:alpha val="70000"/>
+              </a:srgbClr>
+            </a:outerShdw>
+          </a:effectLst>
+        </p:spPr>
+      </p:pic>
+    </p:spTree>
+    <p:extLst>
+      <p:ext uri="{BB962C8B-B14F-4D97-AF65-F5344CB8AC3E}">
+        <p14:creationId xmlns:p14="http://schemas.microsoft.com/office/powerpoint/2010/main" val="3909808179"/>
+      </p:ext>
+    </p:extLst>
+  </p:cSld>
+  <p:clrMapOvr>
+    <a:masterClrMapping/>
+  </p:clrMapOvr>
+  <p:timing>
+    <p:tnLst>
+      <p:par>
+        <p:cTn id="1" dur="indefinite" restart="never" nodeType="tmRoot"/>
+      </p:par>
+    </p:tnLst>
+  </p:timing>
+</p:sld>
+</file>
+
+<file path=ppt/slides/slide14.xml><?xml version="1.0" encoding="utf-8"?>
+<p:sld xmlns:a="http://schemas.openxmlformats.org/drawingml/2006/main" xmlns:r="http://schemas.openxmlformats.org/officeDocument/2006/relationships" xmlns:p="http://schemas.openxmlformats.org/presentationml/2006/main">
+  <p:cSld>
+    <p:spTree>
+      <p:nvGrpSpPr>
+        <p:cNvPr id="1" name=""/>
+        <p:cNvGrpSpPr/>
+        <p:nvPr/>
+      </p:nvGrpSpPr>
+      <p:grpSpPr>
+        <a:xfrm>
+          <a:off x="0" y="0"/>
+          <a:ext cx="0" cy="0"/>
+          <a:chOff x="0" y="0"/>
+          <a:chExt cx="0" cy="0"/>
+        </a:xfrm>
+      </p:grpSpPr>
+      <p:sp>
+        <p:nvSpPr>
+          <p:cNvPr id="2" name="Titre 1">
+            <a:extLst>
+              <a:ext uri="{FF2B5EF4-FFF2-40B4-BE49-F238E27FC236}">
+                <a16:creationId xmlns:a16="http://schemas.microsoft.com/office/drawing/2014/main" id="{7CCBB51A-EDE8-4C6A-9AD7-E8F13DA5D6F3}"/>
+              </a:ext>
+            </a:extLst>
+          </p:cNvPr>
+          <p:cNvSpPr>
+            <a:spLocks noGrp="1"/>
+          </p:cNvSpPr>
+          <p:nvPr>
+            <p:ph type="title"/>
+          </p:nvPr>
+        </p:nvSpPr>
+        <p:spPr>
+          <a:xfrm>
+            <a:off x="0" y="24389"/>
+            <a:ext cx="12192000" cy="1507067"/>
+          </a:xfrm>
+        </p:spPr>
+        <p:txBody>
+          <a:bodyPr/>
+          <a:lstStyle/>
+          <a:p>
+            <a:pPr algn="ctr"/>
+            <a:r>
+              <a:rPr lang="en-GB" dirty="0" err="1" smtClean="0"/>
+              <a:t>Projet</a:t>
+            </a:r>
+            <a:r>
+              <a:rPr lang="en-GB" dirty="0" smtClean="0"/>
+              <a:t> </a:t>
+            </a:r>
+            <a:r>
+              <a:rPr lang="en-GB" dirty="0" err="1" smtClean="0"/>
+              <a:t>Anis</a:t>
+            </a:r>
+            <a:endParaRPr lang="en-GB" dirty="0"/>
+          </a:p>
+        </p:txBody>
+      </p:sp>
+      <p:sp>
+        <p:nvSpPr>
+          <p:cNvPr id="5" name="Espace réservé du numéro de diapositive 4">
+            <a:extLst>
+              <a:ext uri="{FF2B5EF4-FFF2-40B4-BE49-F238E27FC236}">
+                <a16:creationId xmlns:a16="http://schemas.microsoft.com/office/drawing/2014/main" id="{1E82F23A-CB0F-422B-BC99-04C95BE9A3CD}"/>
+              </a:ext>
+            </a:extLst>
+          </p:cNvPr>
+          <p:cNvSpPr>
+            <a:spLocks noGrp="1"/>
+          </p:cNvSpPr>
+          <p:nvPr>
+            <p:ph type="sldNum" sz="quarter" idx="12"/>
+          </p:nvPr>
+        </p:nvSpPr>
+        <p:spPr/>
+        <p:txBody>
+          <a:bodyPr vert="horz" lIns="91440" tIns="45720" rIns="91440" bIns="45720" rtlCol="0" anchor="b"/>
+          <a:lstStyle/>
+          <a:p>
+            <a:fld id="{D57F1E4F-1CFF-5643-939E-217C01CDF565}" type="slidenum">
+              <a:rPr lang="en-US" sz="1800" smtClean="0">
+                <a:solidFill>
+                  <a:schemeClr val="tx1"/>
+                </a:solidFill>
+              </a:rPr>
+              <a:pPr/>
+              <a:t>14</a:t>
+            </a:fld>
+            <a:endParaRPr lang="en-US" sz="1800" dirty="0">
+              <a:solidFill>
+                <a:schemeClr val="tx1"/>
+              </a:solidFill>
+            </a:endParaRPr>
+          </a:p>
+        </p:txBody>
+      </p:sp>
+      <p:pic>
+        <p:nvPicPr>
+          <p:cNvPr id="7" name="Image 6"/>
+          <p:cNvPicPr/>
+          <p:nvPr/>
+        </p:nvPicPr>
+        <p:blipFill>
+          <a:blip r:embed="rId2"/>
+          <a:stretch>
+            <a:fillRect/>
+          </a:stretch>
+        </p:blipFill>
+        <p:spPr>
+          <a:xfrm>
+            <a:off x="3261042" y="1160890"/>
+            <a:ext cx="5669915" cy="5568315"/>
+          </a:xfrm>
+          <a:prstGeom prst="rect">
+            <a:avLst/>
+          </a:prstGeom>
+          <a:ln>
+            <a:noFill/>
+          </a:ln>
+          <a:effectLst>
+            <a:outerShdw blurRad="190500" algn="tl" rotWithShape="0">
+              <a:srgbClr val="000000">
+                <a:alpha val="70000"/>
+              </a:srgbClr>
+            </a:outerShdw>
+          </a:effectLst>
+        </p:spPr>
+      </p:pic>
+    </p:spTree>
+    <p:extLst>
+      <p:ext uri="{BB962C8B-B14F-4D97-AF65-F5344CB8AC3E}">
+        <p14:creationId xmlns:p14="http://schemas.microsoft.com/office/powerpoint/2010/main" val="1630935250"/>
+      </p:ext>
+    </p:extLst>
+  </p:cSld>
+  <p:clrMapOvr>
+    <a:masterClrMapping/>
+  </p:clrMapOvr>
+  <p:timing>
+    <p:tnLst>
+      <p:par>
+        <p:cTn id="1" dur="indefinite" restart="never" nodeType="tmRoot"/>
+      </p:par>
+    </p:tnLst>
+  </p:timing>
+</p:sld>
+</file>
+
+<file path=ppt/slides/slide15.xml><?xml version="1.0" encoding="utf-8"?>
+<p:sld xmlns:a="http://schemas.openxmlformats.org/drawingml/2006/main" xmlns:r="http://schemas.openxmlformats.org/officeDocument/2006/relationships" xmlns:p="http://schemas.openxmlformats.org/presentationml/2006/main">
+  <p:cSld>
+    <p:spTree>
+      <p:nvGrpSpPr>
+        <p:cNvPr id="1" name=""/>
+        <p:cNvGrpSpPr/>
+        <p:nvPr/>
+      </p:nvGrpSpPr>
+      <p:grpSpPr>
+        <a:xfrm>
+          <a:off x="0" y="0"/>
+          <a:ext cx="0" cy="0"/>
+          <a:chOff x="0" y="0"/>
+          <a:chExt cx="0" cy="0"/>
+        </a:xfrm>
+      </p:grpSpPr>
+      <p:sp>
+        <p:nvSpPr>
+          <p:cNvPr id="2" name="Titre 1">
+            <a:extLst>
+              <a:ext uri="{FF2B5EF4-FFF2-40B4-BE49-F238E27FC236}">
+                <a16:creationId xmlns:a16="http://schemas.microsoft.com/office/drawing/2014/main" id="{7CCBB51A-EDE8-4C6A-9AD7-E8F13DA5D6F3}"/>
+              </a:ext>
+            </a:extLst>
+          </p:cNvPr>
+          <p:cNvSpPr>
+            <a:spLocks noGrp="1"/>
+          </p:cNvSpPr>
+          <p:nvPr>
+            <p:ph type="title"/>
+          </p:nvPr>
+        </p:nvSpPr>
+        <p:spPr>
+          <a:xfrm>
+            <a:off x="0" y="24389"/>
+            <a:ext cx="12192000" cy="1507067"/>
+          </a:xfrm>
+        </p:spPr>
+        <p:txBody>
+          <a:bodyPr/>
+          <a:lstStyle/>
+          <a:p>
+            <a:pPr algn="ctr"/>
+            <a:r>
+              <a:rPr lang="en-GB" dirty="0" err="1" smtClean="0"/>
+              <a:t>Projet</a:t>
+            </a:r>
+            <a:r>
+              <a:rPr lang="en-GB" dirty="0" smtClean="0"/>
+              <a:t> </a:t>
+            </a:r>
+            <a:r>
+              <a:rPr lang="en-GB" dirty="0" err="1" smtClean="0"/>
+              <a:t>Anis</a:t>
+            </a:r>
+            <a:endParaRPr lang="fr-FR" dirty="0"/>
           </a:p>
         </p:txBody>
       </p:sp>
@@ -6153,7 +6662,7 @@
                 </a:solidFill>
               </a:rPr>
               <a:pPr/>
-              <a:t>12</a:t>
+              <a:t>15</a:t>
             </a:fld>
             <a:endParaRPr lang="en-US" sz="1800" dirty="0">
               <a:solidFill>
@@ -6173,780 +6682,13 @@
   <p:clrMapOvr>
     <a:masterClrMapping/>
   </p:clrMapOvr>
-</p:sld>
-</file>
-
-<file path=ppt/slides/slide13.xml><?xml version="1.0" encoding="utf-8"?>
-<p:sld xmlns:a="http://schemas.openxmlformats.org/drawingml/2006/main" xmlns:r="http://schemas.openxmlformats.org/officeDocument/2006/relationships" xmlns:p="http://schemas.openxmlformats.org/presentationml/2006/main">
-  <p:cSld>
-    <p:spTree>
-      <p:nvGrpSpPr>
-        <p:cNvPr id="1" name=""/>
-        <p:cNvGrpSpPr/>
-        <p:nvPr/>
-      </p:nvGrpSpPr>
-      <p:grpSpPr>
-        <a:xfrm>
-          <a:off x="0" y="0"/>
-          <a:ext cx="0" cy="0"/>
-          <a:chOff x="0" y="0"/>
-          <a:chExt cx="0" cy="0"/>
-        </a:xfrm>
-      </p:grpSpPr>
-      <p:sp>
-        <p:nvSpPr>
-          <p:cNvPr id="2" name="Titre 1">
-            <a:extLst>
-              <a:ext uri="{FF2B5EF4-FFF2-40B4-BE49-F238E27FC236}">
-                <a16:creationId xmlns:a16="http://schemas.microsoft.com/office/drawing/2014/main" id="{55167647-7EA2-4C0C-83A0-25300BFB7EC2}"/>
-              </a:ext>
-            </a:extLst>
-          </p:cNvPr>
-          <p:cNvSpPr>
-            <a:spLocks noGrp="1"/>
-          </p:cNvSpPr>
-          <p:nvPr>
-            <p:ph type="title"/>
-          </p:nvPr>
-        </p:nvSpPr>
-        <p:spPr>
-          <a:xfrm>
-            <a:off x="684211" y="4487332"/>
-            <a:ext cx="8786959" cy="1507067"/>
-          </a:xfrm>
-        </p:spPr>
-        <p:txBody>
-          <a:bodyPr>
-            <a:normAutofit/>
-          </a:bodyPr>
-          <a:lstStyle/>
-          <a:p>
-            <a:r>
-              <a:rPr lang="fr-FR" dirty="0">
-                <a:solidFill>
-                  <a:schemeClr val="bg2">
-                    <a:lumMod val="20000"/>
-                    <a:lumOff val="80000"/>
-                  </a:schemeClr>
-                </a:solidFill>
-              </a:rPr>
-              <a:t>Analyse d’architecture technique</a:t>
-            </a:r>
-            <a:endParaRPr lang="fr-FR" dirty="0"/>
-          </a:p>
-        </p:txBody>
-      </p:sp>
-      <p:sp>
-        <p:nvSpPr>
-          <p:cNvPr id="4" name="Espace réservé du numéro de diapositive 3">
-            <a:extLst>
-              <a:ext uri="{FF2B5EF4-FFF2-40B4-BE49-F238E27FC236}">
-                <a16:creationId xmlns:a16="http://schemas.microsoft.com/office/drawing/2014/main" id="{865E4FFD-4DB3-46CF-A703-D68E95D5BAA3}"/>
-              </a:ext>
-            </a:extLst>
-          </p:cNvPr>
-          <p:cNvSpPr>
-            <a:spLocks noGrp="1"/>
-          </p:cNvSpPr>
-          <p:nvPr>
-            <p:ph type="sldNum" sz="quarter" idx="12"/>
-          </p:nvPr>
-        </p:nvSpPr>
-        <p:spPr/>
-        <p:txBody>
-          <a:bodyPr vert="horz" lIns="91440" tIns="45720" rIns="91440" bIns="45720" rtlCol="0" anchor="b"/>
-          <a:lstStyle/>
-          <a:p>
-            <a:fld id="{D57F1E4F-1CFF-5643-939E-217C01CDF565}" type="slidenum">
-              <a:rPr lang="en-US" sz="1800" smtClean="0">
-                <a:solidFill>
-                  <a:schemeClr val="tx1"/>
-                </a:solidFill>
-              </a:rPr>
-              <a:pPr/>
-              <a:t>13</a:t>
-            </a:fld>
-            <a:endParaRPr lang="en-US" sz="1800" dirty="0">
-              <a:solidFill>
-                <a:schemeClr val="tx1"/>
-              </a:solidFill>
-            </a:endParaRPr>
-          </a:p>
-        </p:txBody>
-      </p:sp>
-    </p:spTree>
-    <p:extLst>
-      <p:ext uri="{BB962C8B-B14F-4D97-AF65-F5344CB8AC3E}">
-        <p14:creationId xmlns:p14="http://schemas.microsoft.com/office/powerpoint/2010/main" val="631180800"/>
-      </p:ext>
-    </p:extLst>
-  </p:cSld>
-  <p:clrMapOvr>
-    <a:masterClrMapping/>
-  </p:clrMapOvr>
-</p:sld>
-</file>
-
-<file path=ppt/slides/slide14.xml><?xml version="1.0" encoding="utf-8"?>
-<p:sld xmlns:a="http://schemas.openxmlformats.org/drawingml/2006/main" xmlns:r="http://schemas.openxmlformats.org/officeDocument/2006/relationships" xmlns:p="http://schemas.openxmlformats.org/presentationml/2006/main">
-  <p:cSld>
-    <p:spTree>
-      <p:nvGrpSpPr>
-        <p:cNvPr id="1" name=""/>
-        <p:cNvGrpSpPr/>
-        <p:nvPr/>
-      </p:nvGrpSpPr>
-      <p:grpSpPr>
-        <a:xfrm>
-          <a:off x="0" y="0"/>
-          <a:ext cx="0" cy="0"/>
-          <a:chOff x="0" y="0"/>
-          <a:chExt cx="0" cy="0"/>
-        </a:xfrm>
-      </p:grpSpPr>
-      <p:sp>
-        <p:nvSpPr>
-          <p:cNvPr id="2" name="Titre 1">
-            <a:extLst>
-              <a:ext uri="{FF2B5EF4-FFF2-40B4-BE49-F238E27FC236}">
-                <a16:creationId xmlns:a16="http://schemas.microsoft.com/office/drawing/2014/main" id="{7CCBB51A-EDE8-4C6A-9AD7-E8F13DA5D6F3}"/>
-              </a:ext>
-            </a:extLst>
-          </p:cNvPr>
-          <p:cNvSpPr>
-            <a:spLocks noGrp="1"/>
-          </p:cNvSpPr>
-          <p:nvPr>
-            <p:ph type="title"/>
-          </p:nvPr>
-        </p:nvSpPr>
-        <p:spPr>
-          <a:xfrm>
-            <a:off x="0" y="24389"/>
-            <a:ext cx="12192000" cy="1507067"/>
-          </a:xfrm>
-        </p:spPr>
-        <p:txBody>
-          <a:bodyPr/>
-          <a:lstStyle/>
-          <a:p>
-            <a:pPr algn="ctr"/>
-            <a:r>
-              <a:rPr lang="en-GB" dirty="0"/>
-              <a:t>Architecture </a:t>
-            </a:r>
-            <a:r>
-              <a:rPr lang="fr-FR" dirty="0"/>
-              <a:t>actuel</a:t>
-            </a:r>
-            <a:endParaRPr lang="en-GB" dirty="0"/>
-          </a:p>
-        </p:txBody>
-      </p:sp>
-      <p:pic>
-        <p:nvPicPr>
-          <p:cNvPr id="4" name="Espace réservé du contenu 3">
-            <a:extLst>
-              <a:ext uri="{FF2B5EF4-FFF2-40B4-BE49-F238E27FC236}">
-                <a16:creationId xmlns:a16="http://schemas.microsoft.com/office/drawing/2014/main" id="{953D5B9D-20A5-4932-974F-4631FA2B6F8D}"/>
-              </a:ext>
-            </a:extLst>
-          </p:cNvPr>
-          <p:cNvPicPr>
-            <a:picLocks noGrp="1"/>
-          </p:cNvPicPr>
-          <p:nvPr>
-            <p:ph idx="1"/>
-          </p:nvPr>
-        </p:nvPicPr>
-        <p:blipFill>
-          <a:blip r:embed="rId2"/>
-          <a:stretch>
-            <a:fillRect/>
-          </a:stretch>
-        </p:blipFill>
-        <p:spPr>
-          <a:xfrm>
-            <a:off x="1295400" y="1765407"/>
-            <a:ext cx="9601200" cy="3629025"/>
-          </a:xfrm>
-          <a:prstGeom prst="rect">
-            <a:avLst/>
-          </a:prstGeom>
-          <a:ln>
-            <a:noFill/>
-          </a:ln>
-          <a:effectLst>
-            <a:outerShdw blurRad="190500" algn="tl" rotWithShape="0">
-              <a:srgbClr val="000000">
-                <a:alpha val="70000"/>
-              </a:srgbClr>
-            </a:outerShdw>
-          </a:effectLst>
-        </p:spPr>
-      </p:pic>
-      <p:sp>
-        <p:nvSpPr>
-          <p:cNvPr id="6" name="Espace réservé du numéro de diapositive 5">
-            <a:extLst>
-              <a:ext uri="{FF2B5EF4-FFF2-40B4-BE49-F238E27FC236}">
-                <a16:creationId xmlns:a16="http://schemas.microsoft.com/office/drawing/2014/main" id="{9DF81448-6159-4B6A-AEA9-E5D06F770306}"/>
-              </a:ext>
-            </a:extLst>
-          </p:cNvPr>
-          <p:cNvSpPr>
-            <a:spLocks noGrp="1"/>
-          </p:cNvSpPr>
-          <p:nvPr>
-            <p:ph type="sldNum" sz="quarter" idx="12"/>
-          </p:nvPr>
-        </p:nvSpPr>
-        <p:spPr/>
-        <p:txBody>
-          <a:bodyPr vert="horz" lIns="91440" tIns="45720" rIns="91440" bIns="45720" rtlCol="0" anchor="b"/>
-          <a:lstStyle/>
-          <a:p>
-            <a:fld id="{D57F1E4F-1CFF-5643-939E-217C01CDF565}" type="slidenum">
-              <a:rPr lang="en-US" sz="1800" smtClean="0">
-                <a:solidFill>
-                  <a:schemeClr val="tx1"/>
-                </a:solidFill>
-              </a:rPr>
-              <a:pPr/>
-              <a:t>14</a:t>
-            </a:fld>
-            <a:endParaRPr lang="en-US" sz="1800" dirty="0">
-              <a:solidFill>
-                <a:schemeClr val="tx1"/>
-              </a:solidFill>
-            </a:endParaRPr>
-          </a:p>
-        </p:txBody>
-      </p:sp>
-    </p:spTree>
-    <p:extLst>
-      <p:ext uri="{BB962C8B-B14F-4D97-AF65-F5344CB8AC3E}">
-        <p14:creationId xmlns:p14="http://schemas.microsoft.com/office/powerpoint/2010/main" val="2701177395"/>
-      </p:ext>
-    </p:extLst>
-  </p:cSld>
-  <p:clrMapOvr>
-    <a:masterClrMapping/>
-  </p:clrMapOvr>
-</p:sld>
-</file>
-
-<file path=ppt/slides/slide15.xml><?xml version="1.0" encoding="utf-8"?>
-<p:sld xmlns:a="http://schemas.openxmlformats.org/drawingml/2006/main" xmlns:r="http://schemas.openxmlformats.org/officeDocument/2006/relationships" xmlns:p="http://schemas.openxmlformats.org/presentationml/2006/main">
-  <p:cSld>
-    <p:spTree>
-      <p:nvGrpSpPr>
-        <p:cNvPr id="1" name=""/>
-        <p:cNvGrpSpPr/>
-        <p:nvPr/>
-      </p:nvGrpSpPr>
-      <p:grpSpPr>
-        <a:xfrm>
-          <a:off x="0" y="0"/>
-          <a:ext cx="0" cy="0"/>
-          <a:chOff x="0" y="0"/>
-          <a:chExt cx="0" cy="0"/>
-        </a:xfrm>
-      </p:grpSpPr>
-      <p:sp>
-        <p:nvSpPr>
-          <p:cNvPr id="2" name="Titre 1">
-            <a:extLst>
-              <a:ext uri="{FF2B5EF4-FFF2-40B4-BE49-F238E27FC236}">
-                <a16:creationId xmlns:a16="http://schemas.microsoft.com/office/drawing/2014/main" id="{7CCBB51A-EDE8-4C6A-9AD7-E8F13DA5D6F3}"/>
-              </a:ext>
-            </a:extLst>
-          </p:cNvPr>
-          <p:cNvSpPr>
-            <a:spLocks noGrp="1"/>
-          </p:cNvSpPr>
-          <p:nvPr>
-            <p:ph type="title"/>
-          </p:nvPr>
-        </p:nvSpPr>
-        <p:spPr>
-          <a:xfrm>
-            <a:off x="0" y="24389"/>
-            <a:ext cx="12192000" cy="1507067"/>
-          </a:xfrm>
-        </p:spPr>
-        <p:txBody>
-          <a:bodyPr/>
-          <a:lstStyle/>
-          <a:p>
-            <a:pPr algn="ctr"/>
-            <a:r>
-              <a:rPr lang="fr-FR" dirty="0"/>
-              <a:t>Architecture cible</a:t>
-            </a:r>
-            <a:endParaRPr lang="en-GB" dirty="0"/>
-          </a:p>
-        </p:txBody>
-      </p:sp>
-      <p:pic>
-        <p:nvPicPr>
-          <p:cNvPr id="4" name="Espace réservé du contenu 3">
-            <a:extLst>
-              <a:ext uri="{FF2B5EF4-FFF2-40B4-BE49-F238E27FC236}">
-                <a16:creationId xmlns:a16="http://schemas.microsoft.com/office/drawing/2014/main" id="{771AD016-F552-4DBC-873A-9B675CC0878B}"/>
-              </a:ext>
-            </a:extLst>
-          </p:cNvPr>
-          <p:cNvPicPr>
-            <a:picLocks noGrp="1"/>
-          </p:cNvPicPr>
-          <p:nvPr>
-            <p:ph idx="1"/>
-          </p:nvPr>
-        </p:nvPicPr>
-        <p:blipFill>
-          <a:blip r:embed="rId2"/>
-          <a:stretch>
-            <a:fillRect/>
-          </a:stretch>
-        </p:blipFill>
-        <p:spPr>
-          <a:xfrm>
-            <a:off x="2000250" y="1631353"/>
-            <a:ext cx="8191500" cy="4543425"/>
-          </a:xfrm>
-          <a:prstGeom prst="rect">
-            <a:avLst/>
-          </a:prstGeom>
-          <a:ln>
-            <a:noFill/>
-          </a:ln>
-          <a:effectLst>
-            <a:outerShdw blurRad="190500" algn="tl" rotWithShape="0">
-              <a:srgbClr val="000000">
-                <a:alpha val="70000"/>
-              </a:srgbClr>
-            </a:outerShdw>
-          </a:effectLst>
-        </p:spPr>
-      </p:pic>
-      <p:sp>
-        <p:nvSpPr>
-          <p:cNvPr id="6" name="Espace réservé du numéro de diapositive 5">
-            <a:extLst>
-              <a:ext uri="{FF2B5EF4-FFF2-40B4-BE49-F238E27FC236}">
-                <a16:creationId xmlns:a16="http://schemas.microsoft.com/office/drawing/2014/main" id="{7826644F-241E-43C6-8A5A-F7DD89DFC242}"/>
-              </a:ext>
-            </a:extLst>
-          </p:cNvPr>
-          <p:cNvSpPr>
-            <a:spLocks noGrp="1"/>
-          </p:cNvSpPr>
-          <p:nvPr>
-            <p:ph type="sldNum" sz="quarter" idx="12"/>
-          </p:nvPr>
-        </p:nvSpPr>
-        <p:spPr/>
-        <p:txBody>
-          <a:bodyPr vert="horz" lIns="91440" tIns="45720" rIns="91440" bIns="45720" rtlCol="0" anchor="b"/>
-          <a:lstStyle/>
-          <a:p>
-            <a:fld id="{D57F1E4F-1CFF-5643-939E-217C01CDF565}" type="slidenum">
-              <a:rPr lang="en-US" sz="1800" smtClean="0">
-                <a:solidFill>
-                  <a:schemeClr val="tx1"/>
-                </a:solidFill>
-              </a:rPr>
-              <a:pPr/>
-              <a:t>15</a:t>
-            </a:fld>
-            <a:endParaRPr lang="en-US" sz="1800" dirty="0">
-              <a:solidFill>
-                <a:schemeClr val="tx1"/>
-              </a:solidFill>
-            </a:endParaRPr>
-          </a:p>
-        </p:txBody>
-      </p:sp>
-    </p:spTree>
-    <p:extLst>
-      <p:ext uri="{BB962C8B-B14F-4D97-AF65-F5344CB8AC3E}">
-        <p14:creationId xmlns:p14="http://schemas.microsoft.com/office/powerpoint/2010/main" val="3909808179"/>
-      </p:ext>
-    </p:extLst>
-  </p:cSld>
-  <p:clrMapOvr>
-    <a:masterClrMapping/>
-  </p:clrMapOvr>
-</p:sld>
-</file>
-
-<file path=ppt/slides/slide16.xml><?xml version="1.0" encoding="utf-8"?>
-<p:sld xmlns:a="http://schemas.openxmlformats.org/drawingml/2006/main" xmlns:r="http://schemas.openxmlformats.org/officeDocument/2006/relationships" xmlns:p="http://schemas.openxmlformats.org/presentationml/2006/main">
-  <p:cSld>
-    <p:spTree>
-      <p:nvGrpSpPr>
-        <p:cNvPr id="1" name=""/>
-        <p:cNvGrpSpPr/>
-        <p:nvPr/>
-      </p:nvGrpSpPr>
-      <p:grpSpPr>
-        <a:xfrm>
-          <a:off x="0" y="0"/>
-          <a:ext cx="0" cy="0"/>
-          <a:chOff x="0" y="0"/>
-          <a:chExt cx="0" cy="0"/>
-        </a:xfrm>
-      </p:grpSpPr>
-      <p:sp>
-        <p:nvSpPr>
-          <p:cNvPr id="2" name="Titre 1">
-            <a:extLst>
-              <a:ext uri="{FF2B5EF4-FFF2-40B4-BE49-F238E27FC236}">
-                <a16:creationId xmlns:a16="http://schemas.microsoft.com/office/drawing/2014/main" id="{A9B55643-3A72-4BA1-BAAC-3753B976C9F7}"/>
-              </a:ext>
-            </a:extLst>
-          </p:cNvPr>
-          <p:cNvSpPr>
-            <a:spLocks noGrp="1"/>
-          </p:cNvSpPr>
-          <p:nvPr>
-            <p:ph type="title"/>
-          </p:nvPr>
-        </p:nvSpPr>
-        <p:spPr/>
-        <p:txBody>
-          <a:bodyPr/>
-          <a:lstStyle/>
-          <a:p>
-            <a:r>
-              <a:rPr lang="fr-FR" dirty="0">
-                <a:solidFill>
-                  <a:schemeClr val="bg2">
-                    <a:lumMod val="20000"/>
-                    <a:lumOff val="80000"/>
-                  </a:schemeClr>
-                </a:solidFill>
-              </a:rPr>
-              <a:t>Projets retenus</a:t>
-            </a:r>
-            <a:endParaRPr lang="fr-FR" dirty="0"/>
-          </a:p>
-        </p:txBody>
-      </p:sp>
-      <p:sp>
-        <p:nvSpPr>
-          <p:cNvPr id="4" name="Espace réservé du numéro de diapositive 3">
-            <a:extLst>
-              <a:ext uri="{FF2B5EF4-FFF2-40B4-BE49-F238E27FC236}">
-                <a16:creationId xmlns:a16="http://schemas.microsoft.com/office/drawing/2014/main" id="{7FBFAFFD-5FBE-4DE3-91B0-3CC974AC5513}"/>
-              </a:ext>
-            </a:extLst>
-          </p:cNvPr>
-          <p:cNvSpPr>
-            <a:spLocks noGrp="1"/>
-          </p:cNvSpPr>
-          <p:nvPr>
-            <p:ph type="sldNum" sz="quarter" idx="12"/>
-          </p:nvPr>
-        </p:nvSpPr>
-        <p:spPr/>
-        <p:txBody>
-          <a:bodyPr vert="horz" lIns="91440" tIns="45720" rIns="91440" bIns="45720" rtlCol="0" anchor="b"/>
-          <a:lstStyle/>
-          <a:p>
-            <a:fld id="{D57F1E4F-1CFF-5643-939E-217C01CDF565}" type="slidenum">
-              <a:rPr lang="en-US" sz="1800" smtClean="0">
-                <a:solidFill>
-                  <a:schemeClr val="tx1"/>
-                </a:solidFill>
-              </a:rPr>
-              <a:pPr/>
-              <a:t>16</a:t>
-            </a:fld>
-            <a:endParaRPr lang="en-US" sz="1800" dirty="0">
-              <a:solidFill>
-                <a:schemeClr val="tx1"/>
-              </a:solidFill>
-            </a:endParaRPr>
-          </a:p>
-        </p:txBody>
-      </p:sp>
-    </p:spTree>
-    <p:extLst>
-      <p:ext uri="{BB962C8B-B14F-4D97-AF65-F5344CB8AC3E}">
-        <p14:creationId xmlns:p14="http://schemas.microsoft.com/office/powerpoint/2010/main" val="1677109261"/>
-      </p:ext>
-    </p:extLst>
-  </p:cSld>
-  <p:clrMapOvr>
-    <a:masterClrMapping/>
-  </p:clrMapOvr>
-</p:sld>
-</file>
-
-<file path=ppt/slides/slide17.xml><?xml version="1.0" encoding="utf-8"?>
-<p:sld xmlns:a="http://schemas.openxmlformats.org/drawingml/2006/main" xmlns:r="http://schemas.openxmlformats.org/officeDocument/2006/relationships" xmlns:p="http://schemas.openxmlformats.org/presentationml/2006/main">
-  <p:cSld>
-    <p:spTree>
-      <p:nvGrpSpPr>
-        <p:cNvPr id="1" name=""/>
-        <p:cNvGrpSpPr/>
-        <p:nvPr/>
-      </p:nvGrpSpPr>
-      <p:grpSpPr>
-        <a:xfrm>
-          <a:off x="0" y="0"/>
-          <a:ext cx="0" cy="0"/>
-          <a:chOff x="0" y="0"/>
-          <a:chExt cx="0" cy="0"/>
-        </a:xfrm>
-      </p:grpSpPr>
-      <p:sp>
-        <p:nvSpPr>
-          <p:cNvPr id="2" name="Titre 1">
-            <a:extLst>
-              <a:ext uri="{FF2B5EF4-FFF2-40B4-BE49-F238E27FC236}">
-                <a16:creationId xmlns:a16="http://schemas.microsoft.com/office/drawing/2014/main" id="{7CCBB51A-EDE8-4C6A-9AD7-E8F13DA5D6F3}"/>
-              </a:ext>
-            </a:extLst>
-          </p:cNvPr>
-          <p:cNvSpPr>
-            <a:spLocks noGrp="1"/>
-          </p:cNvSpPr>
-          <p:nvPr>
-            <p:ph type="title"/>
-          </p:nvPr>
-        </p:nvSpPr>
-        <p:spPr>
-          <a:xfrm>
-            <a:off x="0" y="24389"/>
-            <a:ext cx="12192000" cy="1507067"/>
-          </a:xfrm>
-        </p:spPr>
-        <p:txBody>
-          <a:bodyPr/>
-          <a:lstStyle/>
-          <a:p>
-            <a:pPr algn="ctr"/>
-            <a:r>
-              <a:rPr lang="en-GB" dirty="0" err="1"/>
-              <a:t>aeronet</a:t>
-            </a:r>
-            <a:endParaRPr lang="en-GB" dirty="0"/>
-          </a:p>
-        </p:txBody>
-      </p:sp>
-      <p:sp>
-        <p:nvSpPr>
-          <p:cNvPr id="3" name="Espace réservé du contenu 2">
-            <a:extLst>
-              <a:ext uri="{FF2B5EF4-FFF2-40B4-BE49-F238E27FC236}">
-                <a16:creationId xmlns:a16="http://schemas.microsoft.com/office/drawing/2014/main" id="{77103813-D207-4F33-A18E-24C91BD78695}"/>
-              </a:ext>
-            </a:extLst>
-          </p:cNvPr>
-          <p:cNvSpPr>
-            <a:spLocks noGrp="1"/>
-          </p:cNvSpPr>
-          <p:nvPr>
-            <p:ph idx="1"/>
-          </p:nvPr>
-        </p:nvSpPr>
-        <p:spPr>
-          <a:xfrm>
-            <a:off x="0" y="1531456"/>
-            <a:ext cx="12192000" cy="5326544"/>
-          </a:xfrm>
-        </p:spPr>
-        <p:txBody>
-          <a:bodyPr/>
-          <a:lstStyle/>
-          <a:p>
-            <a:endParaRPr lang="en-GB"/>
-          </a:p>
-        </p:txBody>
-      </p:sp>
-      <p:sp>
-        <p:nvSpPr>
-          <p:cNvPr id="5" name="Espace réservé du numéro de diapositive 4">
-            <a:extLst>
-              <a:ext uri="{FF2B5EF4-FFF2-40B4-BE49-F238E27FC236}">
-                <a16:creationId xmlns:a16="http://schemas.microsoft.com/office/drawing/2014/main" id="{90CC1D83-4426-4046-9229-D29673090DD8}"/>
-              </a:ext>
-            </a:extLst>
-          </p:cNvPr>
-          <p:cNvSpPr>
-            <a:spLocks noGrp="1"/>
-          </p:cNvSpPr>
-          <p:nvPr>
-            <p:ph type="sldNum" sz="quarter" idx="12"/>
-          </p:nvPr>
-        </p:nvSpPr>
-        <p:spPr/>
-        <p:txBody>
-          <a:bodyPr vert="horz" lIns="91440" tIns="45720" rIns="91440" bIns="45720" rtlCol="0" anchor="b"/>
-          <a:lstStyle/>
-          <a:p>
-            <a:fld id="{D57F1E4F-1CFF-5643-939E-217C01CDF565}" type="slidenum">
-              <a:rPr lang="en-US" sz="1800" smtClean="0">
-                <a:solidFill>
-                  <a:schemeClr val="tx1"/>
-                </a:solidFill>
-              </a:rPr>
-              <a:pPr/>
-              <a:t>17</a:t>
-            </a:fld>
-            <a:endParaRPr lang="en-US" sz="1800" dirty="0">
-              <a:solidFill>
-                <a:schemeClr val="tx1"/>
-              </a:solidFill>
-            </a:endParaRPr>
-          </a:p>
-        </p:txBody>
-      </p:sp>
-    </p:spTree>
-    <p:extLst>
-      <p:ext uri="{BB962C8B-B14F-4D97-AF65-F5344CB8AC3E}">
-        <p14:creationId xmlns:p14="http://schemas.microsoft.com/office/powerpoint/2010/main" val="2500236325"/>
-      </p:ext>
-    </p:extLst>
-  </p:cSld>
-  <p:clrMapOvr>
-    <a:masterClrMapping/>
-  </p:clrMapOvr>
-</p:sld>
-</file>
-
-<file path=ppt/slides/slide18.xml><?xml version="1.0" encoding="utf-8"?>
-<p:sld xmlns:a="http://schemas.openxmlformats.org/drawingml/2006/main" xmlns:r="http://schemas.openxmlformats.org/officeDocument/2006/relationships" xmlns:p="http://schemas.openxmlformats.org/presentationml/2006/main">
-  <p:cSld>
-    <p:spTree>
-      <p:nvGrpSpPr>
-        <p:cNvPr id="1" name=""/>
-        <p:cNvGrpSpPr/>
-        <p:nvPr/>
-      </p:nvGrpSpPr>
-      <p:grpSpPr>
-        <a:xfrm>
-          <a:off x="0" y="0"/>
-          <a:ext cx="0" cy="0"/>
-          <a:chOff x="0" y="0"/>
-          <a:chExt cx="0" cy="0"/>
-        </a:xfrm>
-      </p:grpSpPr>
-      <p:sp>
-        <p:nvSpPr>
-          <p:cNvPr id="2" name="Titre 1">
-            <a:extLst>
-              <a:ext uri="{FF2B5EF4-FFF2-40B4-BE49-F238E27FC236}">
-                <a16:creationId xmlns:a16="http://schemas.microsoft.com/office/drawing/2014/main" id="{7CCBB51A-EDE8-4C6A-9AD7-E8F13DA5D6F3}"/>
-              </a:ext>
-            </a:extLst>
-          </p:cNvPr>
-          <p:cNvSpPr>
-            <a:spLocks noGrp="1"/>
-          </p:cNvSpPr>
-          <p:nvPr>
-            <p:ph type="title"/>
-          </p:nvPr>
-        </p:nvSpPr>
-        <p:spPr>
-          <a:xfrm>
-            <a:off x="0" y="24389"/>
-            <a:ext cx="12192000" cy="1507067"/>
-          </a:xfrm>
-        </p:spPr>
-        <p:txBody>
-          <a:bodyPr/>
-          <a:lstStyle/>
-          <a:p>
-            <a:pPr algn="ctr"/>
-            <a:r>
-              <a:rPr lang="en-GB" dirty="0"/>
-              <a:t>Anis</a:t>
-            </a:r>
-          </a:p>
-        </p:txBody>
-      </p:sp>
-      <p:sp>
-        <p:nvSpPr>
-          <p:cNvPr id="3" name="Espace réservé du contenu 2">
-            <a:extLst>
-              <a:ext uri="{FF2B5EF4-FFF2-40B4-BE49-F238E27FC236}">
-                <a16:creationId xmlns:a16="http://schemas.microsoft.com/office/drawing/2014/main" id="{77103813-D207-4F33-A18E-24C91BD78695}"/>
-              </a:ext>
-            </a:extLst>
-          </p:cNvPr>
-          <p:cNvSpPr>
-            <a:spLocks noGrp="1"/>
-          </p:cNvSpPr>
-          <p:nvPr>
-            <p:ph idx="1"/>
-          </p:nvPr>
-        </p:nvSpPr>
-        <p:spPr>
-          <a:xfrm>
-            <a:off x="0" y="1531456"/>
-            <a:ext cx="12192000" cy="5326544"/>
-          </a:xfrm>
-        </p:spPr>
-        <p:txBody>
-          <a:bodyPr/>
-          <a:lstStyle/>
-          <a:p>
-            <a:endParaRPr lang="en-GB" dirty="0"/>
-          </a:p>
-        </p:txBody>
-      </p:sp>
-      <p:sp>
-        <p:nvSpPr>
-          <p:cNvPr id="5" name="Espace réservé du numéro de diapositive 4">
-            <a:extLst>
-              <a:ext uri="{FF2B5EF4-FFF2-40B4-BE49-F238E27FC236}">
-                <a16:creationId xmlns:a16="http://schemas.microsoft.com/office/drawing/2014/main" id="{1E82F23A-CB0F-422B-BC99-04C95BE9A3CD}"/>
-              </a:ext>
-            </a:extLst>
-          </p:cNvPr>
-          <p:cNvSpPr>
-            <a:spLocks noGrp="1"/>
-          </p:cNvSpPr>
-          <p:nvPr>
-            <p:ph type="sldNum" sz="quarter" idx="12"/>
-          </p:nvPr>
-        </p:nvSpPr>
-        <p:spPr/>
-        <p:txBody>
-          <a:bodyPr vert="horz" lIns="91440" tIns="45720" rIns="91440" bIns="45720" rtlCol="0" anchor="b"/>
-          <a:lstStyle/>
-          <a:p>
-            <a:fld id="{D57F1E4F-1CFF-5643-939E-217C01CDF565}" type="slidenum">
-              <a:rPr lang="en-US" sz="1800" smtClean="0">
-                <a:solidFill>
-                  <a:schemeClr val="tx1"/>
-                </a:solidFill>
-              </a:rPr>
-              <a:pPr/>
-              <a:t>18</a:t>
-            </a:fld>
-            <a:endParaRPr lang="en-US" sz="1800" dirty="0">
-              <a:solidFill>
-                <a:schemeClr val="tx1"/>
-              </a:solidFill>
-            </a:endParaRPr>
-          </a:p>
-        </p:txBody>
-      </p:sp>
-    </p:spTree>
-    <p:extLst>
-      <p:ext uri="{BB962C8B-B14F-4D97-AF65-F5344CB8AC3E}">
-        <p14:creationId xmlns:p14="http://schemas.microsoft.com/office/powerpoint/2010/main" val="1630935250"/>
-      </p:ext>
-    </p:extLst>
-  </p:cSld>
-  <p:clrMapOvr>
-    <a:masterClrMapping/>
-  </p:clrMapOvr>
+  <p:timing>
+    <p:tnLst>
+      <p:par>
+        <p:cTn id="1" dur="indefinite" restart="never" nodeType="tmRoot"/>
+      </p:par>
+    </p:tnLst>
+  </p:timing>
 </p:sld>
 </file>
 
@@ -7075,12 +6817,10 @@
                   </a:schemeClr>
                 </a:solidFill>
               </a:rPr>
-              <a:t>Analyse d’architecture applicative</a:t>
-            </a:r>
-          </a:p>
-          <a:p>
-            <a:r>
-              <a:rPr lang="fr-FR" dirty="0">
+              <a:t>Analyse </a:t>
+            </a:r>
+            <a:r>
+              <a:rPr lang="fr-FR" dirty="0" smtClean="0">
                 <a:solidFill>
                   <a:schemeClr val="bg2">
                     <a:lumMod val="20000"/>
@@ -7088,12 +6828,12 @@
                   </a:schemeClr>
                 </a:solidFill>
               </a:rPr>
-              <a:t>Analyse d’architecture technique</a:t>
-            </a:r>
-          </a:p>
-          <a:p>
-            <a:r>
-              <a:rPr lang="fr-FR" dirty="0">
+              <a:t>du système d’information</a:t>
+            </a:r>
+          </a:p>
+          <a:p>
+            <a:r>
+              <a:rPr lang="fr-FR" dirty="0" smtClean="0">
                 <a:solidFill>
                   <a:schemeClr val="bg2">
                     <a:lumMod val="20000"/>
@@ -7103,6 +6843,14 @@
               </a:rPr>
               <a:t>Projets retenus</a:t>
             </a:r>
+            <a:endParaRPr lang="fr-FR" dirty="0">
+              <a:solidFill>
+                <a:schemeClr val="bg2">
+                  <a:lumMod val="20000"/>
+                  <a:lumOff val="80000"/>
+                </a:schemeClr>
+              </a:solidFill>
+            </a:endParaRPr>
           </a:p>
         </p:txBody>
       </p:sp>
@@ -7154,6 +6902,13 @@
   <p:clrMapOvr>
     <a:masterClrMapping/>
   </p:clrMapOvr>
+  <p:timing>
+    <p:tnLst>
+      <p:par>
+        <p:cTn id="1" dur="indefinite" restart="never" nodeType="tmRoot"/>
+      </p:par>
+    </p:tnLst>
+  </p:timing>
 </p:sld>
 </file>
 
@@ -7263,6 +7018,13 @@
   <p:clrMapOvr>
     <a:masterClrMapping/>
   </p:clrMapOvr>
+  <p:timing>
+    <p:tnLst>
+      <p:par>
+        <p:cTn id="1" dur="indefinite" restart="never" nodeType="tmRoot"/>
+      </p:par>
+    </p:tnLst>
+  </p:timing>
 </p:sld>
 </file>
 
@@ -7318,21 +7080,49 @@
           </a:p>
         </p:txBody>
       </p:sp>
-      <p:pic>
-        <p:nvPicPr>
-          <p:cNvPr id="4" name="Espace réservé du contenu 3">
+      <p:sp>
+        <p:nvSpPr>
+          <p:cNvPr id="5" name="Espace réservé du numéro de diapositive 4">
             <a:extLst>
               <a:ext uri="{FF2B5EF4-FFF2-40B4-BE49-F238E27FC236}">
-                <a16:creationId xmlns:a16="http://schemas.microsoft.com/office/drawing/2014/main" id="{03F99907-D0AD-4072-AFA0-FBA0806D0076}"/>
+                <a16:creationId xmlns:a16="http://schemas.microsoft.com/office/drawing/2014/main" id="{EC005513-DC28-4A6E-8BEA-13296417CA62}"/>
               </a:ext>
             </a:extLst>
           </p:cNvPr>
-          <p:cNvPicPr>
-            <a:picLocks noGrp="1"/>
-          </p:cNvPicPr>
-          <p:nvPr>
-            <p:ph idx="1"/>
-          </p:nvPr>
+          <p:cNvSpPr>
+            <a:spLocks noGrp="1"/>
+          </p:cNvSpPr>
+          <p:nvPr>
+            <p:ph type="sldNum" sz="quarter" idx="12"/>
+          </p:nvPr>
+        </p:nvSpPr>
+        <p:spPr/>
+        <p:txBody>
+          <a:bodyPr vert="horz" lIns="91440" tIns="45720" rIns="91440" bIns="45720" rtlCol="0" anchor="b"/>
+          <a:lstStyle/>
+          <a:p>
+            <a:fld id="{D57F1E4F-1CFF-5643-939E-217C01CDF565}" type="slidenum">
+              <a:rPr lang="en-US" sz="1800" smtClean="0">
+                <a:solidFill>
+                  <a:schemeClr val="tx1"/>
+                </a:solidFill>
+              </a:rPr>
+              <a:pPr/>
+              <a:t>4</a:t>
+            </a:fld>
+            <a:endParaRPr lang="en-US" sz="1800" dirty="0">
+              <a:solidFill>
+                <a:schemeClr val="tx1"/>
+              </a:solidFill>
+            </a:endParaRPr>
+          </a:p>
+        </p:txBody>
+      </p:sp>
+      <p:pic>
+        <p:nvPicPr>
+          <p:cNvPr id="8" name="Image 7"/>
+          <p:cNvPicPr/>
+          <p:nvPr/>
         </p:nvPicPr>
         <p:blipFill>
           <a:blip r:embed="rId2"/>
@@ -7342,8 +7132,8 @@
         </p:blipFill>
         <p:spPr>
           <a:xfrm>
-            <a:off x="1993588" y="1337707"/>
-            <a:ext cx="8204823" cy="5326062"/>
+            <a:off x="914732" y="1297267"/>
+            <a:ext cx="10362536" cy="5058266"/>
           </a:xfrm>
           <a:prstGeom prst="rect">
             <a:avLst/>
@@ -7360,44 +7150,6 @@
           </a:effectLst>
         </p:spPr>
       </p:pic>
-      <p:sp>
-        <p:nvSpPr>
-          <p:cNvPr id="5" name="Espace réservé du numéro de diapositive 4">
-            <a:extLst>
-              <a:ext uri="{FF2B5EF4-FFF2-40B4-BE49-F238E27FC236}">
-                <a16:creationId xmlns:a16="http://schemas.microsoft.com/office/drawing/2014/main" id="{EC005513-DC28-4A6E-8BEA-13296417CA62}"/>
-              </a:ext>
-            </a:extLst>
-          </p:cNvPr>
-          <p:cNvSpPr>
-            <a:spLocks noGrp="1"/>
-          </p:cNvSpPr>
-          <p:nvPr>
-            <p:ph type="sldNum" sz="quarter" idx="12"/>
-          </p:nvPr>
-        </p:nvSpPr>
-        <p:spPr/>
-        <p:txBody>
-          <a:bodyPr vert="horz" lIns="91440" tIns="45720" rIns="91440" bIns="45720" rtlCol="0" anchor="b"/>
-          <a:lstStyle/>
-          <a:p>
-            <a:fld id="{D57F1E4F-1CFF-5643-939E-217C01CDF565}" type="slidenum">
-              <a:rPr lang="en-US" sz="1800" smtClean="0">
-                <a:solidFill>
-                  <a:schemeClr val="tx1"/>
-                </a:solidFill>
-              </a:rPr>
-              <a:pPr/>
-              <a:t>4</a:t>
-            </a:fld>
-            <a:endParaRPr lang="en-US" sz="1800" dirty="0">
-              <a:solidFill>
-                <a:schemeClr val="tx1"/>
-              </a:solidFill>
-            </a:endParaRPr>
-          </a:p>
-        </p:txBody>
-      </p:sp>
     </p:spTree>
     <p:extLst>
       <p:ext uri="{BB962C8B-B14F-4D97-AF65-F5344CB8AC3E}">
@@ -7408,6 +7160,13 @@
   <p:clrMapOvr>
     <a:masterClrMapping/>
   </p:clrMapOvr>
+  <p:timing>
+    <p:tnLst>
+      <p:par>
+        <p:cTn id="1" dur="indefinite" restart="never" nodeType="tmRoot"/>
+      </p:par>
+    </p:tnLst>
+  </p:timing>
 </p:sld>
 </file>
 
@@ -7512,6 +7271,13 @@
   <p:clrMapOvr>
     <a:masterClrMapping/>
   </p:clrMapOvr>
+  <p:timing>
+    <p:tnLst>
+      <p:par>
+        <p:cTn id="1" dur="indefinite" restart="never" nodeType="tmRoot"/>
+      </p:par>
+    </p:tnLst>
+  </p:timing>
 </p:sld>
 </file>
 
@@ -7662,6 +7428,13 @@
   <p:clrMapOvr>
     <a:masterClrMapping/>
   </p:clrMapOvr>
+  <p:timing>
+    <p:tnLst>
+      <p:par>
+        <p:cTn id="1" dur="indefinite" restart="never" nodeType="tmRoot"/>
+      </p:par>
+    </p:tnLst>
+  </p:timing>
 </p:sld>
 </file>
 
@@ -7810,6 +7583,13 @@
   <p:clrMapOvr>
     <a:masterClrMapping/>
   </p:clrMapOvr>
+  <p:timing>
+    <p:tnLst>
+      <p:par>
+        <p:cTn id="1" dur="indefinite" restart="never" nodeType="tmRoot"/>
+      </p:par>
+    </p:tnLst>
+  </p:timing>
 </p:sld>
 </file>
 
@@ -7914,6 +7694,13 @@
   <p:clrMapOvr>
     <a:masterClrMapping/>
   </p:clrMapOvr>
+  <p:timing>
+    <p:tnLst>
+      <p:par>
+        <p:cTn id="1" dur="indefinite" restart="never" nodeType="tmRoot"/>
+      </p:par>
+    </p:tnLst>
+  </p:timing>
 </p:sld>
 </file>
 
@@ -7998,21 +7785,68 @@
           </a:p>
         </p:txBody>
       </p:sp>
-      <p:pic>
-        <p:nvPicPr>
-          <p:cNvPr id="4" name="Espace réservé du contenu 3">
+      <p:sp>
+        <p:nvSpPr>
+          <p:cNvPr id="6" name="Espace réservé du numéro de diapositive 5">
             <a:extLst>
               <a:ext uri="{FF2B5EF4-FFF2-40B4-BE49-F238E27FC236}">
-                <a16:creationId xmlns:a16="http://schemas.microsoft.com/office/drawing/2014/main" id="{7A8B37B8-F6C5-487A-90C7-43EA45007CEF}"/>
+                <a16:creationId xmlns:a16="http://schemas.microsoft.com/office/drawing/2014/main" id="{830E8077-1A86-4F7C-8694-595DA6391EAD}"/>
               </a:ext>
             </a:extLst>
           </p:cNvPr>
-          <p:cNvPicPr>
-            <a:picLocks noGrp="1"/>
-          </p:cNvPicPr>
+          <p:cNvSpPr>
+            <a:spLocks noGrp="1"/>
+          </p:cNvSpPr>
+          <p:nvPr>
+            <p:ph type="sldNum" sz="quarter" idx="12"/>
+          </p:nvPr>
+        </p:nvSpPr>
+        <p:spPr/>
+        <p:txBody>
+          <a:bodyPr vert="horz" lIns="91440" tIns="45720" rIns="91440" bIns="45720" rtlCol="0" anchor="b"/>
+          <a:lstStyle/>
+          <a:p>
+            <a:fld id="{D57F1E4F-1CFF-5643-939E-217C01CDF565}" type="slidenum">
+              <a:rPr lang="en-US" sz="1800" smtClean="0">
+                <a:solidFill>
+                  <a:schemeClr val="tx1"/>
+                </a:solidFill>
+              </a:rPr>
+              <a:pPr/>
+              <a:t>9</a:t>
+            </a:fld>
+            <a:endParaRPr lang="en-US" sz="1800" dirty="0">
+              <a:solidFill>
+                <a:schemeClr val="tx1"/>
+              </a:solidFill>
+            </a:endParaRPr>
+          </a:p>
+        </p:txBody>
+      </p:sp>
+      <p:sp>
+        <p:nvSpPr>
+          <p:cNvPr id="3" name="Espace réservé du contenu 2"/>
+          <p:cNvSpPr>
+            <a:spLocks noGrp="1"/>
+          </p:cNvSpPr>
           <p:nvPr>
             <p:ph idx="1"/>
           </p:nvPr>
+        </p:nvSpPr>
+        <p:spPr/>
+        <p:txBody>
+          <a:bodyPr/>
+          <a:lstStyle/>
+          <a:p>
+            <a:endParaRPr lang="fr-FR"/>
+          </a:p>
+        </p:txBody>
+      </p:sp>
+      <p:pic>
+        <p:nvPicPr>
+          <p:cNvPr id="7" name="Image 6"/>
+          <p:cNvPicPr/>
+          <p:nvPr/>
         </p:nvPicPr>
         <p:blipFill>
           <a:blip r:embed="rId2"/>
@@ -8022,8 +7856,8 @@
         </p:blipFill>
         <p:spPr>
           <a:xfrm>
-            <a:off x="926587" y="1323754"/>
-            <a:ext cx="10338826" cy="5326062"/>
+            <a:off x="911382" y="1249378"/>
+            <a:ext cx="10369236" cy="5174056"/>
           </a:xfrm>
           <a:prstGeom prst="rect">
             <a:avLst/>
@@ -8040,44 +7874,6 @@
           </a:effectLst>
         </p:spPr>
       </p:pic>
-      <p:sp>
-        <p:nvSpPr>
-          <p:cNvPr id="6" name="Espace réservé du numéro de diapositive 5">
-            <a:extLst>
-              <a:ext uri="{FF2B5EF4-FFF2-40B4-BE49-F238E27FC236}">
-                <a16:creationId xmlns:a16="http://schemas.microsoft.com/office/drawing/2014/main" id="{830E8077-1A86-4F7C-8694-595DA6391EAD}"/>
-              </a:ext>
-            </a:extLst>
-          </p:cNvPr>
-          <p:cNvSpPr>
-            <a:spLocks noGrp="1"/>
-          </p:cNvSpPr>
-          <p:nvPr>
-            <p:ph type="sldNum" sz="quarter" idx="12"/>
-          </p:nvPr>
-        </p:nvSpPr>
-        <p:spPr/>
-        <p:txBody>
-          <a:bodyPr vert="horz" lIns="91440" tIns="45720" rIns="91440" bIns="45720" rtlCol="0" anchor="b"/>
-          <a:lstStyle/>
-          <a:p>
-            <a:fld id="{D57F1E4F-1CFF-5643-939E-217C01CDF565}" type="slidenum">
-              <a:rPr lang="en-US" sz="1800" smtClean="0">
-                <a:solidFill>
-                  <a:schemeClr val="tx1"/>
-                </a:solidFill>
-              </a:rPr>
-              <a:pPr/>
-              <a:t>9</a:t>
-            </a:fld>
-            <a:endParaRPr lang="en-US" sz="1800" dirty="0">
-              <a:solidFill>
-                <a:schemeClr val="tx1"/>
-              </a:solidFill>
-            </a:endParaRPr>
-          </a:p>
-        </p:txBody>
-      </p:sp>
     </p:spTree>
     <p:extLst>
       <p:ext uri="{BB962C8B-B14F-4D97-AF65-F5344CB8AC3E}">
@@ -8088,6 +7884,13 @@
   <p:clrMapOvr>
     <a:masterClrMapping/>
   </p:clrMapOvr>
+  <p:timing>
+    <p:tnLst>
+      <p:par>
+        <p:cTn id="1" dur="indefinite" restart="never" nodeType="tmRoot"/>
+      </p:par>
+    </p:tnLst>
+  </p:timing>
 </p:sld>
 </file>
 

</xml_diff>